<commit_message>
day 5 - initial commit
</commit_message>
<xml_diff>
--- a/RxSwiftBasics/day5/RxSwiftBasics5.pptx
+++ b/RxSwiftBasics/day5/RxSwiftBasics5.pptx
@@ -5,15 +5,11 @@
     <p:sldMasterId id="2147483657" r:id="rId1"/>
   </p:sldMasterIdLst>
   <p:notesMasterIdLst>
-    <p:notesMasterId r:id="rId8"/>
+    <p:notesMasterId r:id="rId4"/>
   </p:notesMasterIdLst>
   <p:sldIdLst>
     <p:sldId id="256" r:id="rId2"/>
     <p:sldId id="257" r:id="rId3"/>
-    <p:sldId id="258" r:id="rId4"/>
-    <p:sldId id="259" r:id="rId5"/>
-    <p:sldId id="260" r:id="rId6"/>
-    <p:sldId id="261" r:id="rId7"/>
   </p:sldIdLst>
   <p:sldSz cx="9144000" cy="5143500" type="screen16x9"/>
   <p:notesSz cx="6858000" cy="9144000"/>
@@ -604,410 +600,6 @@
 </file>
 
 <file path=ppt/notesSlides/notesSlide2.xml><?xml version="1.0" encoding="utf-8"?>
-<p:notes xmlns:a="http://schemas.openxmlformats.org/drawingml/2006/main" xmlns:r="http://schemas.openxmlformats.org/officeDocument/2006/relationships" xmlns:p="http://schemas.openxmlformats.org/presentationml/2006/main" showMasterSp="0" showMasterPhAnim="0">
-  <p:cSld>
-    <p:spTree>
-      <p:nvGrpSpPr>
-        <p:cNvPr id="1" name="Shape 185"/>
-        <p:cNvGrpSpPr/>
-        <p:nvPr/>
-      </p:nvGrpSpPr>
-      <p:grpSpPr>
-        <a:xfrm>
-          <a:off x="0" y="0"/>
-          <a:ext cx="0" cy="0"/>
-          <a:chOff x="0" y="0"/>
-          <a:chExt cx="0" cy="0"/>
-        </a:xfrm>
-      </p:grpSpPr>
-      <p:sp>
-        <p:nvSpPr>
-          <p:cNvPr id="186" name="Shape 186"/>
-          <p:cNvSpPr>
-            <a:spLocks noGrp="1" noRot="1" noChangeAspect="1"/>
-          </p:cNvSpPr>
-          <p:nvPr>
-            <p:ph type="sldImg" idx="2"/>
-          </p:nvPr>
-        </p:nvSpPr>
-        <p:spPr>
-          <a:xfrm>
-            <a:off x="381000" y="685800"/>
-            <a:ext cx="6096000" cy="3429000"/>
-          </a:xfrm>
-          <a:custGeom>
-            <a:avLst/>
-            <a:gdLst/>
-            <a:ahLst/>
-            <a:cxnLst/>
-            <a:rect l="0" t="0" r="0" b="0"/>
-            <a:pathLst>
-              <a:path w="120000" h="120000" extrusionOk="0">
-                <a:moveTo>
-                  <a:pt x="0" y="0"/>
-                </a:moveTo>
-                <a:lnTo>
-                  <a:pt x="120000" y="0"/>
-                </a:lnTo>
-                <a:lnTo>
-                  <a:pt x="120000" y="120000"/>
-                </a:lnTo>
-                <a:lnTo>
-                  <a:pt x="0" y="120000"/>
-                </a:lnTo>
-                <a:close/>
-              </a:path>
-            </a:pathLst>
-          </a:custGeom>
-        </p:spPr>
-      </p:sp>
-      <p:sp>
-        <p:nvSpPr>
-          <p:cNvPr id="187" name="Shape 187"/>
-          <p:cNvSpPr txBox="1">
-            <a:spLocks noGrp="1"/>
-          </p:cNvSpPr>
-          <p:nvPr>
-            <p:ph type="body" idx="1"/>
-          </p:nvPr>
-        </p:nvSpPr>
-        <p:spPr>
-          <a:xfrm>
-            <a:off x="685800" y="4343400"/>
-            <a:ext cx="5486400" cy="4114800"/>
-          </a:xfrm>
-          <a:prstGeom prst="rect">
-            <a:avLst/>
-          </a:prstGeom>
-        </p:spPr>
-        <p:txBody>
-          <a:bodyPr wrap="square" lIns="91425" tIns="91425" rIns="91425" bIns="91425" anchor="t" anchorCtr="0">
-            <a:noAutofit/>
-          </a:bodyPr>
-          <a:lstStyle/>
-          <a:p>
-            <a:pPr lvl="0">
-              <a:spcBef>
-                <a:spcPts val="0"/>
-              </a:spcBef>
-              <a:buNone/>
-            </a:pPr>
-            <a:endParaRPr/>
-          </a:p>
-        </p:txBody>
-      </p:sp>
-    </p:spTree>
-  </p:cSld>
-  <p:clrMapOvr>
-    <a:masterClrMapping/>
-  </p:clrMapOvr>
-</p:notes>
-</file>
-
-<file path=ppt/notesSlides/notesSlide3.xml><?xml version="1.0" encoding="utf-8"?>
-<p:notes xmlns:a="http://schemas.openxmlformats.org/drawingml/2006/main" xmlns:r="http://schemas.openxmlformats.org/officeDocument/2006/relationships" xmlns:p="http://schemas.openxmlformats.org/presentationml/2006/main" showMasterSp="0" showMasterPhAnim="0">
-  <p:cSld>
-    <p:spTree>
-      <p:nvGrpSpPr>
-        <p:cNvPr id="1" name="Shape 185"/>
-        <p:cNvGrpSpPr/>
-        <p:nvPr/>
-      </p:nvGrpSpPr>
-      <p:grpSpPr>
-        <a:xfrm>
-          <a:off x="0" y="0"/>
-          <a:ext cx="0" cy="0"/>
-          <a:chOff x="0" y="0"/>
-          <a:chExt cx="0" cy="0"/>
-        </a:xfrm>
-      </p:grpSpPr>
-      <p:sp>
-        <p:nvSpPr>
-          <p:cNvPr id="186" name="Shape 186"/>
-          <p:cNvSpPr>
-            <a:spLocks noGrp="1" noRot="1" noChangeAspect="1"/>
-          </p:cNvSpPr>
-          <p:nvPr>
-            <p:ph type="sldImg" idx="2"/>
-          </p:nvPr>
-        </p:nvSpPr>
-        <p:spPr>
-          <a:xfrm>
-            <a:off x="381000" y="685800"/>
-            <a:ext cx="6096000" cy="3429000"/>
-          </a:xfrm>
-          <a:custGeom>
-            <a:avLst/>
-            <a:gdLst/>
-            <a:ahLst/>
-            <a:cxnLst/>
-            <a:rect l="0" t="0" r="0" b="0"/>
-            <a:pathLst>
-              <a:path w="120000" h="120000" extrusionOk="0">
-                <a:moveTo>
-                  <a:pt x="0" y="0"/>
-                </a:moveTo>
-                <a:lnTo>
-                  <a:pt x="120000" y="0"/>
-                </a:lnTo>
-                <a:lnTo>
-                  <a:pt x="120000" y="120000"/>
-                </a:lnTo>
-                <a:lnTo>
-                  <a:pt x="0" y="120000"/>
-                </a:lnTo>
-                <a:close/>
-              </a:path>
-            </a:pathLst>
-          </a:custGeom>
-        </p:spPr>
-      </p:sp>
-      <p:sp>
-        <p:nvSpPr>
-          <p:cNvPr id="187" name="Shape 187"/>
-          <p:cNvSpPr txBox="1">
-            <a:spLocks noGrp="1"/>
-          </p:cNvSpPr>
-          <p:nvPr>
-            <p:ph type="body" idx="1"/>
-          </p:nvPr>
-        </p:nvSpPr>
-        <p:spPr>
-          <a:xfrm>
-            <a:off x="685800" y="4343400"/>
-            <a:ext cx="5486400" cy="4114800"/>
-          </a:xfrm>
-          <a:prstGeom prst="rect">
-            <a:avLst/>
-          </a:prstGeom>
-        </p:spPr>
-        <p:txBody>
-          <a:bodyPr wrap="square" lIns="91425" tIns="91425" rIns="91425" bIns="91425" anchor="t" anchorCtr="0">
-            <a:noAutofit/>
-          </a:bodyPr>
-          <a:lstStyle/>
-          <a:p>
-            <a:pPr lvl="0">
-              <a:spcBef>
-                <a:spcPts val="0"/>
-              </a:spcBef>
-              <a:buNone/>
-            </a:pPr>
-            <a:endParaRPr/>
-          </a:p>
-        </p:txBody>
-      </p:sp>
-    </p:spTree>
-  </p:cSld>
-  <p:clrMapOvr>
-    <a:masterClrMapping/>
-  </p:clrMapOvr>
-</p:notes>
-</file>
-
-<file path=ppt/notesSlides/notesSlide4.xml><?xml version="1.0" encoding="utf-8"?>
-<p:notes xmlns:a="http://schemas.openxmlformats.org/drawingml/2006/main" xmlns:r="http://schemas.openxmlformats.org/officeDocument/2006/relationships" xmlns:p="http://schemas.openxmlformats.org/presentationml/2006/main" showMasterSp="0" showMasterPhAnim="0">
-  <p:cSld>
-    <p:spTree>
-      <p:nvGrpSpPr>
-        <p:cNvPr id="1" name="Shape 185"/>
-        <p:cNvGrpSpPr/>
-        <p:nvPr/>
-      </p:nvGrpSpPr>
-      <p:grpSpPr>
-        <a:xfrm>
-          <a:off x="0" y="0"/>
-          <a:ext cx="0" cy="0"/>
-          <a:chOff x="0" y="0"/>
-          <a:chExt cx="0" cy="0"/>
-        </a:xfrm>
-      </p:grpSpPr>
-      <p:sp>
-        <p:nvSpPr>
-          <p:cNvPr id="186" name="Shape 186"/>
-          <p:cNvSpPr>
-            <a:spLocks noGrp="1" noRot="1" noChangeAspect="1"/>
-          </p:cNvSpPr>
-          <p:nvPr>
-            <p:ph type="sldImg" idx="2"/>
-          </p:nvPr>
-        </p:nvSpPr>
-        <p:spPr>
-          <a:xfrm>
-            <a:off x="381000" y="685800"/>
-            <a:ext cx="6096000" cy="3429000"/>
-          </a:xfrm>
-          <a:custGeom>
-            <a:avLst/>
-            <a:gdLst/>
-            <a:ahLst/>
-            <a:cxnLst/>
-            <a:rect l="0" t="0" r="0" b="0"/>
-            <a:pathLst>
-              <a:path w="120000" h="120000" extrusionOk="0">
-                <a:moveTo>
-                  <a:pt x="0" y="0"/>
-                </a:moveTo>
-                <a:lnTo>
-                  <a:pt x="120000" y="0"/>
-                </a:lnTo>
-                <a:lnTo>
-                  <a:pt x="120000" y="120000"/>
-                </a:lnTo>
-                <a:lnTo>
-                  <a:pt x="0" y="120000"/>
-                </a:lnTo>
-                <a:close/>
-              </a:path>
-            </a:pathLst>
-          </a:custGeom>
-        </p:spPr>
-      </p:sp>
-      <p:sp>
-        <p:nvSpPr>
-          <p:cNvPr id="187" name="Shape 187"/>
-          <p:cNvSpPr txBox="1">
-            <a:spLocks noGrp="1"/>
-          </p:cNvSpPr>
-          <p:nvPr>
-            <p:ph type="body" idx="1"/>
-          </p:nvPr>
-        </p:nvSpPr>
-        <p:spPr>
-          <a:xfrm>
-            <a:off x="685800" y="4343400"/>
-            <a:ext cx="5486400" cy="4114800"/>
-          </a:xfrm>
-          <a:prstGeom prst="rect">
-            <a:avLst/>
-          </a:prstGeom>
-        </p:spPr>
-        <p:txBody>
-          <a:bodyPr wrap="square" lIns="91425" tIns="91425" rIns="91425" bIns="91425" anchor="t" anchorCtr="0">
-            <a:noAutofit/>
-          </a:bodyPr>
-          <a:lstStyle/>
-          <a:p>
-            <a:pPr lvl="0">
-              <a:spcBef>
-                <a:spcPts val="0"/>
-              </a:spcBef>
-              <a:buNone/>
-            </a:pPr>
-            <a:endParaRPr/>
-          </a:p>
-        </p:txBody>
-      </p:sp>
-    </p:spTree>
-  </p:cSld>
-  <p:clrMapOvr>
-    <a:masterClrMapping/>
-  </p:clrMapOvr>
-</p:notes>
-</file>
-
-<file path=ppt/notesSlides/notesSlide5.xml><?xml version="1.0" encoding="utf-8"?>
-<p:notes xmlns:a="http://schemas.openxmlformats.org/drawingml/2006/main" xmlns:r="http://schemas.openxmlformats.org/officeDocument/2006/relationships" xmlns:p="http://schemas.openxmlformats.org/presentationml/2006/main" showMasterSp="0" showMasterPhAnim="0">
-  <p:cSld>
-    <p:spTree>
-      <p:nvGrpSpPr>
-        <p:cNvPr id="1" name="Shape 185"/>
-        <p:cNvGrpSpPr/>
-        <p:nvPr/>
-      </p:nvGrpSpPr>
-      <p:grpSpPr>
-        <a:xfrm>
-          <a:off x="0" y="0"/>
-          <a:ext cx="0" cy="0"/>
-          <a:chOff x="0" y="0"/>
-          <a:chExt cx="0" cy="0"/>
-        </a:xfrm>
-      </p:grpSpPr>
-      <p:sp>
-        <p:nvSpPr>
-          <p:cNvPr id="186" name="Shape 186"/>
-          <p:cNvSpPr>
-            <a:spLocks noGrp="1" noRot="1" noChangeAspect="1"/>
-          </p:cNvSpPr>
-          <p:nvPr>
-            <p:ph type="sldImg" idx="2"/>
-          </p:nvPr>
-        </p:nvSpPr>
-        <p:spPr>
-          <a:xfrm>
-            <a:off x="381000" y="685800"/>
-            <a:ext cx="6096000" cy="3429000"/>
-          </a:xfrm>
-          <a:custGeom>
-            <a:avLst/>
-            <a:gdLst/>
-            <a:ahLst/>
-            <a:cxnLst/>
-            <a:rect l="0" t="0" r="0" b="0"/>
-            <a:pathLst>
-              <a:path w="120000" h="120000" extrusionOk="0">
-                <a:moveTo>
-                  <a:pt x="0" y="0"/>
-                </a:moveTo>
-                <a:lnTo>
-                  <a:pt x="120000" y="0"/>
-                </a:lnTo>
-                <a:lnTo>
-                  <a:pt x="120000" y="120000"/>
-                </a:lnTo>
-                <a:lnTo>
-                  <a:pt x="0" y="120000"/>
-                </a:lnTo>
-                <a:close/>
-              </a:path>
-            </a:pathLst>
-          </a:custGeom>
-        </p:spPr>
-      </p:sp>
-      <p:sp>
-        <p:nvSpPr>
-          <p:cNvPr id="187" name="Shape 187"/>
-          <p:cNvSpPr txBox="1">
-            <a:spLocks noGrp="1"/>
-          </p:cNvSpPr>
-          <p:nvPr>
-            <p:ph type="body" idx="1"/>
-          </p:nvPr>
-        </p:nvSpPr>
-        <p:spPr>
-          <a:xfrm>
-            <a:off x="685800" y="4343400"/>
-            <a:ext cx="5486400" cy="4114800"/>
-          </a:xfrm>
-          <a:prstGeom prst="rect">
-            <a:avLst/>
-          </a:prstGeom>
-        </p:spPr>
-        <p:txBody>
-          <a:bodyPr wrap="square" lIns="91425" tIns="91425" rIns="91425" bIns="91425" anchor="t" anchorCtr="0">
-            <a:noAutofit/>
-          </a:bodyPr>
-          <a:lstStyle/>
-          <a:p>
-            <a:pPr lvl="0">
-              <a:spcBef>
-                <a:spcPts val="0"/>
-              </a:spcBef>
-              <a:buNone/>
-            </a:pPr>
-            <a:endParaRPr/>
-          </a:p>
-        </p:txBody>
-      </p:sp>
-    </p:spTree>
-  </p:cSld>
-  <p:clrMapOvr>
-    <a:masterClrMapping/>
-  </p:clrMapOvr>
-</p:notes>
-</file>
-
-<file path=ppt/notesSlides/notesSlide6.xml><?xml version="1.0" encoding="utf-8"?>
 <p:notes xmlns:a="http://schemas.openxmlformats.org/drawingml/2006/main" xmlns:r="http://schemas.openxmlformats.org/officeDocument/2006/relationships" xmlns:p="http://schemas.openxmlformats.org/presentationml/2006/main" showMasterSp="0" showMasterPhAnim="0">
   <p:cSld>
     <p:spTree>
@@ -3526,7 +3118,7 @@
             </a:r>
             <a:r>
               <a:rPr lang="en-US" sz="4400" dirty="0" smtClean="0"/>
-              <a:t>4</a:t>
+              <a:t>5</a:t>
             </a:r>
             <a:endParaRPr lang="en" sz="4400" dirty="0"/>
           </a:p>
@@ -3834,12 +3426,8 @@
               <a:buNone/>
             </a:pPr>
             <a:r>
-              <a:rPr lang="en-US" dirty="0" err="1" smtClean="0"/>
-              <a:t>Enum</a:t>
-            </a:r>
-            <a:r>
               <a:rPr lang="en-US" dirty="0" smtClean="0"/>
-              <a:t> - merge return values</a:t>
+              <a:t>Comprehensive Lab</a:t>
             </a:r>
             <a:endParaRPr lang="en" dirty="0"/>
           </a:p>
@@ -3914,87 +3502,20 @@
           </a:prstGeom>
         </p:spPr>
       </p:pic>
-      <p:pic>
-        <p:nvPicPr>
-          <p:cNvPr id="4" name="Picture 3" descr="Screen Shot 2018-04-22 at 11.25.25 PM.png"/>
-          <p:cNvPicPr>
-            <a:picLocks noChangeAspect="1"/>
-          </p:cNvPicPr>
-          <p:nvPr/>
-        </p:nvPicPr>
-        <p:blipFill>
-          <a:blip r:embed="rId4">
-            <a:extLst>
-              <a:ext uri="{28A0092B-C50C-407E-A947-70E740481C1C}">
-                <a14:useLocalDpi xmlns:a14="http://schemas.microsoft.com/office/drawing/2010/main" val="0"/>
-              </a:ext>
-            </a:extLst>
-          </a:blip>
-          <a:stretch>
-            <a:fillRect/>
-          </a:stretch>
-        </p:blipFill>
-        <p:spPr>
-          <a:xfrm>
-            <a:off x="1068875" y="1733893"/>
-            <a:ext cx="5003800" cy="2806700"/>
-          </a:xfrm>
-          <a:prstGeom prst="rect">
-            <a:avLst/>
-          </a:prstGeom>
-        </p:spPr>
-      </p:pic>
-    </p:spTree>
-    <p:extLst>
-      <p:ext uri="{BB962C8B-B14F-4D97-AF65-F5344CB8AC3E}">
-        <p14:creationId xmlns:p14="http://schemas.microsoft.com/office/powerpoint/2010/main" val="2148075556"/>
-      </p:ext>
-    </p:extLst>
-  </p:cSld>
-  <p:clrMapOvr>
-    <a:masterClrMapping/>
-  </p:clrMapOvr>
-  <p:timing>
-    <p:tnLst>
-      <p:par>
-        <p:cTn xmlns:p14="http://schemas.microsoft.com/office/powerpoint/2010/main" id="1" dur="indefinite" restart="never" nodeType="tmRoot"/>
-      </p:par>
-    </p:tnLst>
-  </p:timing>
-</p:sld>
-</file>
-
-<file path=ppt/slides/slide3.xml><?xml version="1.0" encoding="utf-8"?>
-<p:sld xmlns:a="http://schemas.openxmlformats.org/drawingml/2006/main" xmlns:r="http://schemas.openxmlformats.org/officeDocument/2006/relationships" xmlns:p="http://schemas.openxmlformats.org/presentationml/2006/main">
-  <p:cSld>
-    <p:spTree>
-      <p:nvGrpSpPr>
-        <p:cNvPr id="1" name="Shape 188"/>
-        <p:cNvGrpSpPr/>
-        <p:nvPr/>
-      </p:nvGrpSpPr>
-      <p:grpSpPr>
-        <a:xfrm>
-          <a:off x="0" y="0"/>
-          <a:ext cx="0" cy="0"/>
-          <a:chOff x="0" y="0"/>
-          <a:chExt cx="0" cy="0"/>
-        </a:xfrm>
-      </p:grpSpPr>
       <p:sp>
         <p:nvSpPr>
-          <p:cNvPr id="189" name="Shape 189"/>
+          <p:cNvPr id="6" name="Shape 237"/>
           <p:cNvSpPr txBox="1">
             <a:spLocks noGrp="1"/>
           </p:cNvSpPr>
           <p:nvPr>
-            <p:ph type="title"/>
+            <p:ph type="body" idx="1"/>
           </p:nvPr>
         </p:nvSpPr>
         <p:spPr>
           <a:xfrm>
-            <a:off x="814274" y="392575"/>
-            <a:ext cx="5837779" cy="766200"/>
+            <a:off x="814274" y="1475320"/>
+            <a:ext cx="6941095" cy="2526036"/>
           </a:xfrm>
           <a:prstGeom prst="rect">
             <a:avLst/>
@@ -4006,742 +3527,106 @@
           </a:bodyPr>
           <a:lstStyle/>
           <a:p>
+            <a:pPr>
+              <a:buNone/>
+            </a:pPr>
             <a:r>
-              <a:rPr lang="en-US" dirty="0"/>
-              <a:t>Business Logic </a:t>
+              <a:rPr lang="en-US" b="1" dirty="0"/>
+              <a:t>Observable </a:t>
+            </a:r>
+            <a:endParaRPr lang="en-US" dirty="0"/>
+          </a:p>
+          <a:p>
+            <a:r>
+              <a:rPr lang="en-US" dirty="0" smtClean="0"/>
+              <a:t> </a:t>
             </a:r>
             <a:r>
-              <a:rPr lang="mr-IN" dirty="0"/>
+              <a:rPr lang="en-US" dirty="0" smtClean="0"/>
+              <a:t>Create login and get profile observables</a:t>
+            </a:r>
+          </a:p>
+          <a:p>
+            <a:pPr>
+              <a:buNone/>
+            </a:pPr>
+            <a:r>
+              <a:rPr lang="en-US" b="1" dirty="0" smtClean="0"/>
+              <a:t>Sequential Call</a:t>
+            </a:r>
+            <a:r>
+              <a:rPr lang="en-US" dirty="0" smtClean="0"/>
+              <a:t> </a:t>
+            </a:r>
+            <a:r>
+              <a:rPr lang="mr-IN" dirty="0" smtClean="0"/>
               <a:t>–</a:t>
             </a:r>
             <a:r>
-              <a:rPr lang="en-US" dirty="0"/>
-              <a:t> API Call (Serial Sequence)</a:t>
+              <a:rPr lang="en-US" dirty="0" smtClean="0"/>
+              <a:t> Two Observables</a:t>
             </a:r>
+          </a:p>
+          <a:p>
+            <a:pPr>
+              <a:buNone/>
+            </a:pPr>
+            <a:r>
+              <a:rPr lang="en-US" b="1" dirty="0" err="1" smtClean="0"/>
+              <a:t>RxCocoa</a:t>
+            </a:r>
+            <a:r>
+              <a:rPr lang="en-US" b="1" dirty="0" smtClean="0"/>
+              <a:t> UI Binding</a:t>
+            </a:r>
+            <a:r>
+              <a:rPr lang="en-US" dirty="0" smtClean="0"/>
+              <a:t> </a:t>
+            </a:r>
+            <a:r>
+              <a:rPr lang="mr-IN" dirty="0" smtClean="0"/>
+              <a:t>–</a:t>
+            </a:r>
+            <a:r>
+              <a:rPr lang="en-US" dirty="0" smtClean="0"/>
+              <a:t> button, </a:t>
+            </a:r>
+            <a:r>
+              <a:rPr lang="en-US" dirty="0" err="1" smtClean="0"/>
+              <a:t>textfield</a:t>
+            </a:r>
+            <a:r>
+              <a:rPr lang="en-US" dirty="0" smtClean="0"/>
+              <a:t>, </a:t>
+            </a:r>
+            <a:r>
+              <a:rPr lang="en-US" dirty="0" err="1" smtClean="0"/>
+              <a:t>TableView</a:t>
+            </a:r>
+            <a:endParaRPr lang="en-US" dirty="0" smtClean="0"/>
+          </a:p>
+          <a:p>
+            <a:pPr>
+              <a:buNone/>
+            </a:pPr>
+            <a:r>
+              <a:rPr lang="en-US" b="1" dirty="0" smtClean="0"/>
+              <a:t>Subject, Relay</a:t>
+            </a:r>
+            <a:endParaRPr lang="en-US" dirty="0"/>
+          </a:p>
+          <a:p>
+            <a:pPr>
+              <a:buNone/>
+            </a:pPr>
+            <a:endParaRPr lang="en-US" dirty="0"/>
           </a:p>
         </p:txBody>
       </p:sp>
-      <p:sp>
-        <p:nvSpPr>
-          <p:cNvPr id="192" name="Shape 192"/>
-          <p:cNvSpPr txBox="1">
-            <a:spLocks noGrp="1"/>
-          </p:cNvSpPr>
-          <p:nvPr>
-            <p:ph type="sldNum" idx="12"/>
-          </p:nvPr>
-        </p:nvSpPr>
-        <p:spPr>
-          <a:xfrm>
-            <a:off x="7618000" y="4636500"/>
-            <a:ext cx="1487400" cy="315600"/>
-          </a:xfrm>
-          <a:prstGeom prst="rect">
-            <a:avLst/>
-          </a:prstGeom>
-        </p:spPr>
-        <p:txBody>
-          <a:bodyPr wrap="square" lIns="91425" tIns="91425" rIns="91425" bIns="91425" anchor="ctr" anchorCtr="0">
-            <a:noAutofit/>
-          </a:bodyPr>
-          <a:lstStyle/>
-          <a:p>
-            <a:pPr lvl="0">
-              <a:spcBef>
-                <a:spcPts val="0"/>
-              </a:spcBef>
-              <a:buNone/>
-            </a:pPr>
-            <a:fld id="{00000000-1234-1234-1234-123412341234}" type="slidenum">
-              <a:rPr lang="en"/>
-              <a:t>3</a:t>
-            </a:fld>
-            <a:endParaRPr lang="en"/>
-          </a:p>
-        </p:txBody>
-      </p:sp>
-      <p:pic>
-        <p:nvPicPr>
-          <p:cNvPr id="2" name="Picture 1" descr="Rx_Logo_M.png"/>
-          <p:cNvPicPr>
-            <a:picLocks noChangeAspect="1"/>
-          </p:cNvPicPr>
-          <p:nvPr/>
-        </p:nvPicPr>
-        <p:blipFill>
-          <a:blip r:embed="rId3">
-            <a:extLst>
-              <a:ext uri="{28A0092B-C50C-407E-A947-70E740481C1C}">
-                <a14:useLocalDpi xmlns:a14="http://schemas.microsoft.com/office/drawing/2010/main" val="0"/>
-              </a:ext>
-            </a:extLst>
-          </a:blip>
-          <a:stretch>
-            <a:fillRect/>
-          </a:stretch>
-        </p:blipFill>
-        <p:spPr>
-          <a:xfrm>
-            <a:off x="151129" y="442005"/>
-            <a:ext cx="663146" cy="663146"/>
-          </a:xfrm>
-          <a:prstGeom prst="rect">
-            <a:avLst/>
-          </a:prstGeom>
-        </p:spPr>
-      </p:pic>
-      <p:pic>
-        <p:nvPicPr>
-          <p:cNvPr id="3" name="Picture 2" descr="Screen Shot 2018-04-28 at 2.00.16 PM.png"/>
-          <p:cNvPicPr>
-            <a:picLocks noChangeAspect="1"/>
-          </p:cNvPicPr>
-          <p:nvPr/>
-        </p:nvPicPr>
-        <p:blipFill>
-          <a:blip r:embed="rId4">
-            <a:extLst>
-              <a:ext uri="{28A0092B-C50C-407E-A947-70E740481C1C}">
-                <a14:useLocalDpi xmlns:a14="http://schemas.microsoft.com/office/drawing/2010/main" val="0"/>
-              </a:ext>
-            </a:extLst>
-          </a:blip>
-          <a:stretch>
-            <a:fillRect/>
-          </a:stretch>
-        </p:blipFill>
-        <p:spPr>
-          <a:xfrm>
-            <a:off x="0" y="1900591"/>
-            <a:ext cx="4532184" cy="2481910"/>
-          </a:xfrm>
-          <a:prstGeom prst="rect">
-            <a:avLst/>
-          </a:prstGeom>
-        </p:spPr>
-      </p:pic>
-      <p:pic>
-        <p:nvPicPr>
-          <p:cNvPr id="4" name="Picture 3" descr="Screen Shot 2018-04-28 at 2.01.46 PM.png"/>
-          <p:cNvPicPr>
-            <a:picLocks noChangeAspect="1"/>
-          </p:cNvPicPr>
-          <p:nvPr/>
-        </p:nvPicPr>
-        <p:blipFill>
-          <a:blip r:embed="rId5">
-            <a:extLst>
-              <a:ext uri="{28A0092B-C50C-407E-A947-70E740481C1C}">
-                <a14:useLocalDpi xmlns:a14="http://schemas.microsoft.com/office/drawing/2010/main" val="0"/>
-              </a:ext>
-            </a:extLst>
-          </a:blip>
-          <a:stretch>
-            <a:fillRect/>
-          </a:stretch>
-        </p:blipFill>
-        <p:spPr>
-          <a:xfrm>
-            <a:off x="4462162" y="1778530"/>
-            <a:ext cx="4681838" cy="2617701"/>
-          </a:xfrm>
-          <a:prstGeom prst="rect">
-            <a:avLst/>
-          </a:prstGeom>
-        </p:spPr>
-      </p:pic>
     </p:spTree>
     <p:extLst>
       <p:ext uri="{BB962C8B-B14F-4D97-AF65-F5344CB8AC3E}">
-        <p14:creationId xmlns:p14="http://schemas.microsoft.com/office/powerpoint/2010/main" val="1005667817"/>
-      </p:ext>
-    </p:extLst>
-  </p:cSld>
-  <p:clrMapOvr>
-    <a:masterClrMapping/>
-  </p:clrMapOvr>
-  <p:timing>
-    <p:tnLst>
-      <p:par>
-        <p:cTn xmlns:p14="http://schemas.microsoft.com/office/powerpoint/2010/main" id="1" dur="indefinite" restart="never" nodeType="tmRoot"/>
-      </p:par>
-    </p:tnLst>
-  </p:timing>
-</p:sld>
-</file>
-
-<file path=ppt/slides/slide4.xml><?xml version="1.0" encoding="utf-8"?>
-<p:sld xmlns:a="http://schemas.openxmlformats.org/drawingml/2006/main" xmlns:r="http://schemas.openxmlformats.org/officeDocument/2006/relationships" xmlns:p="http://schemas.openxmlformats.org/presentationml/2006/main">
-  <p:cSld>
-    <p:spTree>
-      <p:nvGrpSpPr>
-        <p:cNvPr id="1" name="Shape 188"/>
-        <p:cNvGrpSpPr/>
-        <p:nvPr/>
-      </p:nvGrpSpPr>
-      <p:grpSpPr>
-        <a:xfrm>
-          <a:off x="0" y="0"/>
-          <a:ext cx="0" cy="0"/>
-          <a:chOff x="0" y="0"/>
-          <a:chExt cx="0" cy="0"/>
-        </a:xfrm>
-      </p:grpSpPr>
-      <p:sp>
-        <p:nvSpPr>
-          <p:cNvPr id="189" name="Shape 189"/>
-          <p:cNvSpPr txBox="1">
-            <a:spLocks noGrp="1"/>
-          </p:cNvSpPr>
-          <p:nvPr>
-            <p:ph type="title"/>
-          </p:nvPr>
-        </p:nvSpPr>
-        <p:spPr>
-          <a:xfrm>
-            <a:off x="814274" y="392575"/>
-            <a:ext cx="5837779" cy="766200"/>
-          </a:xfrm>
-          <a:prstGeom prst="rect">
-            <a:avLst/>
-          </a:prstGeom>
-        </p:spPr>
-        <p:txBody>
-          <a:bodyPr wrap="square" lIns="91425" tIns="91425" rIns="91425" bIns="91425" anchor="ctr" anchorCtr="0">
-            <a:noAutofit/>
-          </a:bodyPr>
-          <a:lstStyle/>
-          <a:p>
-            <a:r>
-              <a:rPr lang="en-US" dirty="0"/>
-              <a:t>Business Logic </a:t>
-            </a:r>
-            <a:r>
-              <a:rPr lang="mr-IN" dirty="0"/>
-              <a:t>–</a:t>
-            </a:r>
-            <a:r>
-              <a:rPr lang="en-US" dirty="0"/>
-              <a:t> API Call (Serial Sequence)</a:t>
-            </a:r>
-          </a:p>
-        </p:txBody>
-      </p:sp>
-      <p:sp>
-        <p:nvSpPr>
-          <p:cNvPr id="192" name="Shape 192"/>
-          <p:cNvSpPr txBox="1">
-            <a:spLocks noGrp="1"/>
-          </p:cNvSpPr>
-          <p:nvPr>
-            <p:ph type="sldNum" idx="12"/>
-          </p:nvPr>
-        </p:nvSpPr>
-        <p:spPr>
-          <a:xfrm>
-            <a:off x="7618000" y="4636500"/>
-            <a:ext cx="1487400" cy="315600"/>
-          </a:xfrm>
-          <a:prstGeom prst="rect">
-            <a:avLst/>
-          </a:prstGeom>
-        </p:spPr>
-        <p:txBody>
-          <a:bodyPr wrap="square" lIns="91425" tIns="91425" rIns="91425" bIns="91425" anchor="ctr" anchorCtr="0">
-            <a:noAutofit/>
-          </a:bodyPr>
-          <a:lstStyle/>
-          <a:p>
-            <a:pPr lvl="0">
-              <a:spcBef>
-                <a:spcPts val="0"/>
-              </a:spcBef>
-              <a:buNone/>
-            </a:pPr>
-            <a:fld id="{00000000-1234-1234-1234-123412341234}" type="slidenum">
-              <a:rPr lang="en"/>
-              <a:t>4</a:t>
-            </a:fld>
-            <a:endParaRPr lang="en"/>
-          </a:p>
-        </p:txBody>
-      </p:sp>
-      <p:pic>
-        <p:nvPicPr>
-          <p:cNvPr id="2" name="Picture 1" descr="Rx_Logo_M.png"/>
-          <p:cNvPicPr>
-            <a:picLocks noChangeAspect="1"/>
-          </p:cNvPicPr>
-          <p:nvPr/>
-        </p:nvPicPr>
-        <p:blipFill>
-          <a:blip r:embed="rId3">
-            <a:extLst>
-              <a:ext uri="{28A0092B-C50C-407E-A947-70E740481C1C}">
-                <a14:useLocalDpi xmlns:a14="http://schemas.microsoft.com/office/drawing/2010/main" val="0"/>
-              </a:ext>
-            </a:extLst>
-          </a:blip>
-          <a:stretch>
-            <a:fillRect/>
-          </a:stretch>
-        </p:blipFill>
-        <p:spPr>
-          <a:xfrm>
-            <a:off x="151129" y="442005"/>
-            <a:ext cx="663146" cy="663146"/>
-          </a:xfrm>
-          <a:prstGeom prst="rect">
-            <a:avLst/>
-          </a:prstGeom>
-        </p:spPr>
-      </p:pic>
-      <p:pic>
-        <p:nvPicPr>
-          <p:cNvPr id="3" name="Picture 2" descr="Screen Shot 2018-04-16 at 10.16.02 PM.png"/>
-          <p:cNvPicPr>
-            <a:picLocks noChangeAspect="1"/>
-          </p:cNvPicPr>
-          <p:nvPr/>
-        </p:nvPicPr>
-        <p:blipFill>
-          <a:blip r:embed="rId4">
-            <a:extLst>
-              <a:ext uri="{28A0092B-C50C-407E-A947-70E740481C1C}">
-                <a14:useLocalDpi xmlns:a14="http://schemas.microsoft.com/office/drawing/2010/main" val="0"/>
-              </a:ext>
-            </a:extLst>
-          </a:blip>
-          <a:stretch>
-            <a:fillRect/>
-          </a:stretch>
-        </p:blipFill>
-        <p:spPr>
-          <a:xfrm>
-            <a:off x="419930" y="1485239"/>
-            <a:ext cx="6060502" cy="3395680"/>
-          </a:xfrm>
-          <a:prstGeom prst="rect">
-            <a:avLst/>
-          </a:prstGeom>
-        </p:spPr>
-      </p:pic>
-    </p:spTree>
-    <p:extLst>
-      <p:ext uri="{BB962C8B-B14F-4D97-AF65-F5344CB8AC3E}">
-        <p14:creationId xmlns:p14="http://schemas.microsoft.com/office/powerpoint/2010/main" val="2151135079"/>
-      </p:ext>
-    </p:extLst>
-  </p:cSld>
-  <p:clrMapOvr>
-    <a:masterClrMapping/>
-  </p:clrMapOvr>
-  <p:timing>
-    <p:tnLst>
-      <p:par>
-        <p:cTn xmlns:p14="http://schemas.microsoft.com/office/powerpoint/2010/main" id="1" dur="indefinite" restart="never" nodeType="tmRoot"/>
-      </p:par>
-    </p:tnLst>
-  </p:timing>
-</p:sld>
-</file>
-
-<file path=ppt/slides/slide5.xml><?xml version="1.0" encoding="utf-8"?>
-<p:sld xmlns:a="http://schemas.openxmlformats.org/drawingml/2006/main" xmlns:r="http://schemas.openxmlformats.org/officeDocument/2006/relationships" xmlns:p="http://schemas.openxmlformats.org/presentationml/2006/main">
-  <p:cSld>
-    <p:spTree>
-      <p:nvGrpSpPr>
-        <p:cNvPr id="1" name="Shape 188"/>
-        <p:cNvGrpSpPr/>
-        <p:nvPr/>
-      </p:nvGrpSpPr>
-      <p:grpSpPr>
-        <a:xfrm>
-          <a:off x="0" y="0"/>
-          <a:ext cx="0" cy="0"/>
-          <a:chOff x="0" y="0"/>
-          <a:chExt cx="0" cy="0"/>
-        </a:xfrm>
-      </p:grpSpPr>
-      <p:sp>
-        <p:nvSpPr>
-          <p:cNvPr id="189" name="Shape 189"/>
-          <p:cNvSpPr txBox="1">
-            <a:spLocks noGrp="1"/>
-          </p:cNvSpPr>
-          <p:nvPr>
-            <p:ph type="title"/>
-          </p:nvPr>
-        </p:nvSpPr>
-        <p:spPr>
-          <a:xfrm>
-            <a:off x="814274" y="392575"/>
-            <a:ext cx="5837779" cy="766200"/>
-          </a:xfrm>
-          <a:prstGeom prst="rect">
-            <a:avLst/>
-          </a:prstGeom>
-        </p:spPr>
-        <p:txBody>
-          <a:bodyPr wrap="square" lIns="91425" tIns="91425" rIns="91425" bIns="91425" anchor="ctr" anchorCtr="0">
-            <a:noAutofit/>
-          </a:bodyPr>
-          <a:lstStyle/>
-          <a:p>
-            <a:r>
-              <a:rPr lang="en-US" dirty="0"/>
-              <a:t>Business Logic </a:t>
-            </a:r>
-            <a:r>
-              <a:rPr lang="mr-IN" dirty="0"/>
-              <a:t>–</a:t>
-            </a:r>
-            <a:r>
-              <a:rPr lang="en-US" dirty="0"/>
-              <a:t> API Call (Serial Sequence)</a:t>
-            </a:r>
-          </a:p>
-        </p:txBody>
-      </p:sp>
-      <p:sp>
-        <p:nvSpPr>
-          <p:cNvPr id="192" name="Shape 192"/>
-          <p:cNvSpPr txBox="1">
-            <a:spLocks noGrp="1"/>
-          </p:cNvSpPr>
-          <p:nvPr>
-            <p:ph type="sldNum" idx="12"/>
-          </p:nvPr>
-        </p:nvSpPr>
-        <p:spPr>
-          <a:xfrm>
-            <a:off x="7618000" y="4636500"/>
-            <a:ext cx="1487400" cy="315600"/>
-          </a:xfrm>
-          <a:prstGeom prst="rect">
-            <a:avLst/>
-          </a:prstGeom>
-        </p:spPr>
-        <p:txBody>
-          <a:bodyPr wrap="square" lIns="91425" tIns="91425" rIns="91425" bIns="91425" anchor="ctr" anchorCtr="0">
-            <a:noAutofit/>
-          </a:bodyPr>
-          <a:lstStyle/>
-          <a:p>
-            <a:pPr lvl="0">
-              <a:spcBef>
-                <a:spcPts val="0"/>
-              </a:spcBef>
-              <a:buNone/>
-            </a:pPr>
-            <a:fld id="{00000000-1234-1234-1234-123412341234}" type="slidenum">
-              <a:rPr lang="en"/>
-              <a:t>5</a:t>
-            </a:fld>
-            <a:endParaRPr lang="en"/>
-          </a:p>
-        </p:txBody>
-      </p:sp>
-      <p:pic>
-        <p:nvPicPr>
-          <p:cNvPr id="2" name="Picture 1" descr="Rx_Logo_M.png"/>
-          <p:cNvPicPr>
-            <a:picLocks noChangeAspect="1"/>
-          </p:cNvPicPr>
-          <p:nvPr/>
-        </p:nvPicPr>
-        <p:blipFill>
-          <a:blip r:embed="rId3">
-            <a:extLst>
-              <a:ext uri="{28A0092B-C50C-407E-A947-70E740481C1C}">
-                <a14:useLocalDpi xmlns:a14="http://schemas.microsoft.com/office/drawing/2010/main" val="0"/>
-              </a:ext>
-            </a:extLst>
-          </a:blip>
-          <a:stretch>
-            <a:fillRect/>
-          </a:stretch>
-        </p:blipFill>
-        <p:spPr>
-          <a:xfrm>
-            <a:off x="151129" y="442005"/>
-            <a:ext cx="663146" cy="663146"/>
-          </a:xfrm>
-          <a:prstGeom prst="rect">
-            <a:avLst/>
-          </a:prstGeom>
-        </p:spPr>
-      </p:pic>
-      <p:pic>
-        <p:nvPicPr>
-          <p:cNvPr id="4" name="Picture 3" descr="Screen Shot 2018-04-28 at 2.19.04 PM.png"/>
-          <p:cNvPicPr>
-            <a:picLocks noChangeAspect="1"/>
-          </p:cNvPicPr>
-          <p:nvPr/>
-        </p:nvPicPr>
-        <p:blipFill>
-          <a:blip r:embed="rId4">
-            <a:extLst>
-              <a:ext uri="{28A0092B-C50C-407E-A947-70E740481C1C}">
-                <a14:useLocalDpi xmlns:a14="http://schemas.microsoft.com/office/drawing/2010/main" val="0"/>
-              </a:ext>
-            </a:extLst>
-          </a:blip>
-          <a:stretch>
-            <a:fillRect/>
-          </a:stretch>
-        </p:blipFill>
-        <p:spPr>
-          <a:xfrm>
-            <a:off x="4220101" y="1773679"/>
-            <a:ext cx="4807194" cy="2862821"/>
-          </a:xfrm>
-          <a:prstGeom prst="rect">
-            <a:avLst/>
-          </a:prstGeom>
-        </p:spPr>
-      </p:pic>
-      <p:pic>
-        <p:nvPicPr>
-          <p:cNvPr id="3" name="Picture 2" descr="Screen Shot 2018-04-28 at 2.18.52 PM.png"/>
-          <p:cNvPicPr>
-            <a:picLocks noChangeAspect="1"/>
-          </p:cNvPicPr>
-          <p:nvPr/>
-        </p:nvPicPr>
-        <p:blipFill>
-          <a:blip r:embed="rId5">
-            <a:extLst>
-              <a:ext uri="{28A0092B-C50C-407E-A947-70E740481C1C}">
-                <a14:useLocalDpi xmlns:a14="http://schemas.microsoft.com/office/drawing/2010/main" val="0"/>
-              </a:ext>
-            </a:extLst>
-          </a:blip>
-          <a:stretch>
-            <a:fillRect/>
-          </a:stretch>
-        </p:blipFill>
-        <p:spPr>
-          <a:xfrm>
-            <a:off x="109939" y="1825025"/>
-            <a:ext cx="4449116" cy="2156598"/>
-          </a:xfrm>
-          <a:prstGeom prst="rect">
-            <a:avLst/>
-          </a:prstGeom>
-        </p:spPr>
-      </p:pic>
-    </p:spTree>
-    <p:extLst>
-      <p:ext uri="{BB962C8B-B14F-4D97-AF65-F5344CB8AC3E}">
-        <p14:creationId xmlns:p14="http://schemas.microsoft.com/office/powerpoint/2010/main" val="2217473167"/>
-      </p:ext>
-    </p:extLst>
-  </p:cSld>
-  <p:clrMapOvr>
-    <a:masterClrMapping/>
-  </p:clrMapOvr>
-  <p:timing>
-    <p:tnLst>
-      <p:par>
-        <p:cTn xmlns:p14="http://schemas.microsoft.com/office/powerpoint/2010/main" id="1" dur="indefinite" restart="never" nodeType="tmRoot"/>
-      </p:par>
-    </p:tnLst>
-  </p:timing>
-</p:sld>
-</file>
-
-<file path=ppt/slides/slide6.xml><?xml version="1.0" encoding="utf-8"?>
-<p:sld xmlns:a="http://schemas.openxmlformats.org/drawingml/2006/main" xmlns:r="http://schemas.openxmlformats.org/officeDocument/2006/relationships" xmlns:p="http://schemas.openxmlformats.org/presentationml/2006/main">
-  <p:cSld>
-    <p:spTree>
-      <p:nvGrpSpPr>
-        <p:cNvPr id="1" name="Shape 188"/>
-        <p:cNvGrpSpPr/>
-        <p:nvPr/>
-      </p:nvGrpSpPr>
-      <p:grpSpPr>
-        <a:xfrm>
-          <a:off x="0" y="0"/>
-          <a:ext cx="0" cy="0"/>
-          <a:chOff x="0" y="0"/>
-          <a:chExt cx="0" cy="0"/>
-        </a:xfrm>
-      </p:grpSpPr>
-      <p:sp>
-        <p:nvSpPr>
-          <p:cNvPr id="189" name="Shape 189"/>
-          <p:cNvSpPr txBox="1">
-            <a:spLocks noGrp="1"/>
-          </p:cNvSpPr>
-          <p:nvPr>
-            <p:ph type="title"/>
-          </p:nvPr>
-        </p:nvSpPr>
-        <p:spPr>
-          <a:xfrm>
-            <a:off x="814275" y="463877"/>
-            <a:ext cx="6009403" cy="520452"/>
-          </a:xfrm>
-          <a:prstGeom prst="rect">
-            <a:avLst/>
-          </a:prstGeom>
-        </p:spPr>
-        <p:txBody>
-          <a:bodyPr wrap="square" lIns="91425" tIns="91425" rIns="91425" bIns="91425" anchor="ctr" anchorCtr="0">
-            <a:noAutofit/>
-          </a:bodyPr>
-          <a:lstStyle/>
-          <a:p>
-            <a:r>
-              <a:rPr lang="en-US" dirty="0"/>
-              <a:t>Business Logic </a:t>
-            </a:r>
-            <a:r>
-              <a:rPr lang="mr-IN" dirty="0"/>
-              <a:t>–</a:t>
-            </a:r>
-            <a:r>
-              <a:rPr lang="en-US" dirty="0"/>
-              <a:t> API Call (Multi, Serial Sequence)</a:t>
-            </a:r>
-          </a:p>
-        </p:txBody>
-      </p:sp>
-      <p:sp>
-        <p:nvSpPr>
-          <p:cNvPr id="192" name="Shape 192"/>
-          <p:cNvSpPr txBox="1">
-            <a:spLocks noGrp="1"/>
-          </p:cNvSpPr>
-          <p:nvPr>
-            <p:ph type="sldNum" idx="12"/>
-          </p:nvPr>
-        </p:nvSpPr>
-        <p:spPr>
-          <a:xfrm>
-            <a:off x="7618000" y="4636500"/>
-            <a:ext cx="1487400" cy="315600"/>
-          </a:xfrm>
-          <a:prstGeom prst="rect">
-            <a:avLst/>
-          </a:prstGeom>
-        </p:spPr>
-        <p:txBody>
-          <a:bodyPr wrap="square" lIns="91425" tIns="91425" rIns="91425" bIns="91425" anchor="ctr" anchorCtr="0">
-            <a:noAutofit/>
-          </a:bodyPr>
-          <a:lstStyle/>
-          <a:p>
-            <a:pPr lvl="0">
-              <a:spcBef>
-                <a:spcPts val="0"/>
-              </a:spcBef>
-              <a:buNone/>
-            </a:pPr>
-            <a:fld id="{00000000-1234-1234-1234-123412341234}" type="slidenum">
-              <a:rPr lang="en"/>
-              <a:t>6</a:t>
-            </a:fld>
-            <a:endParaRPr lang="en"/>
-          </a:p>
-        </p:txBody>
-      </p:sp>
-      <p:pic>
-        <p:nvPicPr>
-          <p:cNvPr id="2" name="Picture 1" descr="Rx_Logo_M.png"/>
-          <p:cNvPicPr>
-            <a:picLocks noChangeAspect="1"/>
-          </p:cNvPicPr>
-          <p:nvPr/>
-        </p:nvPicPr>
-        <p:blipFill>
-          <a:blip r:embed="rId3">
-            <a:extLst>
-              <a:ext uri="{28A0092B-C50C-407E-A947-70E740481C1C}">
-                <a14:useLocalDpi xmlns:a14="http://schemas.microsoft.com/office/drawing/2010/main" val="0"/>
-              </a:ext>
-            </a:extLst>
-          </a:blip>
-          <a:stretch>
-            <a:fillRect/>
-          </a:stretch>
-        </p:blipFill>
-        <p:spPr>
-          <a:xfrm>
-            <a:off x="151129" y="442005"/>
-            <a:ext cx="663146" cy="663146"/>
-          </a:xfrm>
-          <a:prstGeom prst="rect">
-            <a:avLst/>
-          </a:prstGeom>
-        </p:spPr>
-      </p:pic>
-      <p:pic>
-        <p:nvPicPr>
-          <p:cNvPr id="6" name="Picture 5" descr="Screen Shot 2018-04-28 at 8.34.13 PM.png"/>
-          <p:cNvPicPr>
-            <a:picLocks noChangeAspect="1"/>
-          </p:cNvPicPr>
-          <p:nvPr/>
-        </p:nvPicPr>
-        <p:blipFill>
-          <a:blip r:embed="rId4">
-            <a:extLst>
-              <a:ext uri="{28A0092B-C50C-407E-A947-70E740481C1C}">
-                <a14:useLocalDpi xmlns:a14="http://schemas.microsoft.com/office/drawing/2010/main" val="0"/>
-              </a:ext>
-            </a:extLst>
-          </a:blip>
-          <a:stretch>
-            <a:fillRect/>
-          </a:stretch>
-        </p:blipFill>
-        <p:spPr>
-          <a:xfrm>
-            <a:off x="4238107" y="1338235"/>
-            <a:ext cx="4904103" cy="3174857"/>
-          </a:xfrm>
-          <a:prstGeom prst="rect">
-            <a:avLst/>
-          </a:prstGeom>
-        </p:spPr>
-      </p:pic>
-      <p:pic>
-        <p:nvPicPr>
-          <p:cNvPr id="4" name="Picture 3" descr="Screen Shot 2018-05-01 at 8.07.31 PM.png"/>
-          <p:cNvPicPr>
-            <a:picLocks noChangeAspect="1"/>
-          </p:cNvPicPr>
-          <p:nvPr/>
-        </p:nvPicPr>
-        <p:blipFill>
-          <a:blip r:embed="rId5">
-            <a:extLst>
-              <a:ext uri="{28A0092B-C50C-407E-A947-70E740481C1C}">
-                <a14:useLocalDpi xmlns:a14="http://schemas.microsoft.com/office/drawing/2010/main" val="0"/>
-              </a:ext>
-            </a:extLst>
-          </a:blip>
-          <a:stretch>
-            <a:fillRect/>
-          </a:stretch>
-        </p:blipFill>
-        <p:spPr>
-          <a:xfrm>
-            <a:off x="0" y="1353594"/>
-            <a:ext cx="4259934" cy="2808952"/>
-          </a:xfrm>
-          <a:prstGeom prst="rect">
-            <a:avLst/>
-          </a:prstGeom>
-        </p:spPr>
-      </p:pic>
-    </p:spTree>
-    <p:extLst>
-      <p:ext uri="{BB962C8B-B14F-4D97-AF65-F5344CB8AC3E}">
-        <p14:creationId xmlns:p14="http://schemas.microsoft.com/office/powerpoint/2010/main" val="3022908544"/>
+        <p14:creationId xmlns:p14="http://schemas.microsoft.com/office/powerpoint/2010/main" val="2148075556"/>
       </p:ext>
     </p:extLst>
   </p:cSld>

</xml_diff>

<commit_message>
Update PPT file (day5)
</commit_message>
<xml_diff>
--- a/RxSwiftBasics/day5/RxSwiftBasics5.pptx
+++ b/RxSwiftBasics/day5/RxSwiftBasics5.pptx
@@ -5,7 +5,7 @@
     <p:sldMasterId id="2147483657" r:id="rId1"/>
   </p:sldMasterIdLst>
   <p:notesMasterIdLst>
-    <p:notesMasterId r:id="rId8"/>
+    <p:notesMasterId r:id="rId10"/>
   </p:notesMasterIdLst>
   <p:sldIdLst>
     <p:sldId id="256" r:id="rId2"/>
@@ -14,6 +14,8 @@
     <p:sldId id="260" r:id="rId5"/>
     <p:sldId id="261" r:id="rId6"/>
     <p:sldId id="257" r:id="rId7"/>
+    <p:sldId id="263" r:id="rId8"/>
+    <p:sldId id="262" r:id="rId9"/>
   </p:sldIdLst>
   <p:sldSz cx="9144000" cy="5143500" type="screen16x9"/>
   <p:notesSz cx="6858000" cy="9144000"/>
@@ -1008,6 +1010,208 @@
 </file>
 
 <file path=ppt/notesSlides/notesSlide6.xml><?xml version="1.0" encoding="utf-8"?>
+<p:notes xmlns:a="http://schemas.openxmlformats.org/drawingml/2006/main" xmlns:r="http://schemas.openxmlformats.org/officeDocument/2006/relationships" xmlns:p="http://schemas.openxmlformats.org/presentationml/2006/main" showMasterSp="0" showMasterPhAnim="0">
+  <p:cSld>
+    <p:spTree>
+      <p:nvGrpSpPr>
+        <p:cNvPr id="1" name="Shape 185"/>
+        <p:cNvGrpSpPr/>
+        <p:nvPr/>
+      </p:nvGrpSpPr>
+      <p:grpSpPr>
+        <a:xfrm>
+          <a:off x="0" y="0"/>
+          <a:ext cx="0" cy="0"/>
+          <a:chOff x="0" y="0"/>
+          <a:chExt cx="0" cy="0"/>
+        </a:xfrm>
+      </p:grpSpPr>
+      <p:sp>
+        <p:nvSpPr>
+          <p:cNvPr id="186" name="Shape 186"/>
+          <p:cNvSpPr>
+            <a:spLocks noGrp="1" noRot="1" noChangeAspect="1"/>
+          </p:cNvSpPr>
+          <p:nvPr>
+            <p:ph type="sldImg" idx="2"/>
+          </p:nvPr>
+        </p:nvSpPr>
+        <p:spPr>
+          <a:xfrm>
+            <a:off x="381000" y="685800"/>
+            <a:ext cx="6096000" cy="3429000"/>
+          </a:xfrm>
+          <a:custGeom>
+            <a:avLst/>
+            <a:gdLst/>
+            <a:ahLst/>
+            <a:cxnLst/>
+            <a:rect l="0" t="0" r="0" b="0"/>
+            <a:pathLst>
+              <a:path w="120000" h="120000" extrusionOk="0">
+                <a:moveTo>
+                  <a:pt x="0" y="0"/>
+                </a:moveTo>
+                <a:lnTo>
+                  <a:pt x="120000" y="0"/>
+                </a:lnTo>
+                <a:lnTo>
+                  <a:pt x="120000" y="120000"/>
+                </a:lnTo>
+                <a:lnTo>
+                  <a:pt x="0" y="120000"/>
+                </a:lnTo>
+                <a:close/>
+              </a:path>
+            </a:pathLst>
+          </a:custGeom>
+        </p:spPr>
+      </p:sp>
+      <p:sp>
+        <p:nvSpPr>
+          <p:cNvPr id="187" name="Shape 187"/>
+          <p:cNvSpPr txBox="1">
+            <a:spLocks noGrp="1"/>
+          </p:cNvSpPr>
+          <p:nvPr>
+            <p:ph type="body" idx="1"/>
+          </p:nvPr>
+        </p:nvSpPr>
+        <p:spPr>
+          <a:xfrm>
+            <a:off x="685800" y="4343400"/>
+            <a:ext cx="5486400" cy="4114800"/>
+          </a:xfrm>
+          <a:prstGeom prst="rect">
+            <a:avLst/>
+          </a:prstGeom>
+        </p:spPr>
+        <p:txBody>
+          <a:bodyPr wrap="square" lIns="91425" tIns="91425" rIns="91425" bIns="91425" anchor="t" anchorCtr="0">
+            <a:noAutofit/>
+          </a:bodyPr>
+          <a:lstStyle/>
+          <a:p>
+            <a:pPr lvl="0">
+              <a:spcBef>
+                <a:spcPts val="0"/>
+              </a:spcBef>
+              <a:buNone/>
+            </a:pPr>
+            <a:endParaRPr/>
+          </a:p>
+        </p:txBody>
+      </p:sp>
+    </p:spTree>
+  </p:cSld>
+  <p:clrMapOvr>
+    <a:masterClrMapping/>
+  </p:clrMapOvr>
+</p:notes>
+</file>
+
+<file path=ppt/notesSlides/notesSlide7.xml><?xml version="1.0" encoding="utf-8"?>
+<p:notes xmlns:a="http://schemas.openxmlformats.org/drawingml/2006/main" xmlns:r="http://schemas.openxmlformats.org/officeDocument/2006/relationships" xmlns:p="http://schemas.openxmlformats.org/presentationml/2006/main" showMasterSp="0" showMasterPhAnim="0">
+  <p:cSld>
+    <p:spTree>
+      <p:nvGrpSpPr>
+        <p:cNvPr id="1" name="Shape 185"/>
+        <p:cNvGrpSpPr/>
+        <p:nvPr/>
+      </p:nvGrpSpPr>
+      <p:grpSpPr>
+        <a:xfrm>
+          <a:off x="0" y="0"/>
+          <a:ext cx="0" cy="0"/>
+          <a:chOff x="0" y="0"/>
+          <a:chExt cx="0" cy="0"/>
+        </a:xfrm>
+      </p:grpSpPr>
+      <p:sp>
+        <p:nvSpPr>
+          <p:cNvPr id="186" name="Shape 186"/>
+          <p:cNvSpPr>
+            <a:spLocks noGrp="1" noRot="1" noChangeAspect="1"/>
+          </p:cNvSpPr>
+          <p:nvPr>
+            <p:ph type="sldImg" idx="2"/>
+          </p:nvPr>
+        </p:nvSpPr>
+        <p:spPr>
+          <a:xfrm>
+            <a:off x="381000" y="685800"/>
+            <a:ext cx="6096000" cy="3429000"/>
+          </a:xfrm>
+          <a:custGeom>
+            <a:avLst/>
+            <a:gdLst/>
+            <a:ahLst/>
+            <a:cxnLst/>
+            <a:rect l="0" t="0" r="0" b="0"/>
+            <a:pathLst>
+              <a:path w="120000" h="120000" extrusionOk="0">
+                <a:moveTo>
+                  <a:pt x="0" y="0"/>
+                </a:moveTo>
+                <a:lnTo>
+                  <a:pt x="120000" y="0"/>
+                </a:lnTo>
+                <a:lnTo>
+                  <a:pt x="120000" y="120000"/>
+                </a:lnTo>
+                <a:lnTo>
+                  <a:pt x="0" y="120000"/>
+                </a:lnTo>
+                <a:close/>
+              </a:path>
+            </a:pathLst>
+          </a:custGeom>
+        </p:spPr>
+      </p:sp>
+      <p:sp>
+        <p:nvSpPr>
+          <p:cNvPr id="187" name="Shape 187"/>
+          <p:cNvSpPr txBox="1">
+            <a:spLocks noGrp="1"/>
+          </p:cNvSpPr>
+          <p:nvPr>
+            <p:ph type="body" idx="1"/>
+          </p:nvPr>
+        </p:nvSpPr>
+        <p:spPr>
+          <a:xfrm>
+            <a:off x="685800" y="4343400"/>
+            <a:ext cx="5486400" cy="4114800"/>
+          </a:xfrm>
+          <a:prstGeom prst="rect">
+            <a:avLst/>
+          </a:prstGeom>
+        </p:spPr>
+        <p:txBody>
+          <a:bodyPr wrap="square" lIns="91425" tIns="91425" rIns="91425" bIns="91425" anchor="t" anchorCtr="0">
+            <a:noAutofit/>
+          </a:bodyPr>
+          <a:lstStyle/>
+          <a:p>
+            <a:pPr lvl="0">
+              <a:spcBef>
+                <a:spcPts val="0"/>
+              </a:spcBef>
+              <a:buNone/>
+            </a:pPr>
+            <a:endParaRPr/>
+          </a:p>
+        </p:txBody>
+      </p:sp>
+    </p:spTree>
+  </p:cSld>
+  <p:clrMapOvr>
+    <a:masterClrMapping/>
+  </p:clrMapOvr>
+</p:notes>
+</file>
+
+<file path=ppt/notesSlides/notesSlide8.xml><?xml version="1.0" encoding="utf-8"?>
 <p:notes xmlns:a="http://schemas.openxmlformats.org/drawingml/2006/main" xmlns:r="http://schemas.openxmlformats.org/officeDocument/2006/relationships" xmlns:p="http://schemas.openxmlformats.org/presentationml/2006/main" showMasterSp="0" showMasterPhAnim="0">
   <p:cSld>
     <p:spTree>
@@ -3831,11 +4035,7 @@
             </a:pPr>
             <a:r>
               <a:rPr lang="en-US" dirty="0" smtClean="0"/>
-              <a:t>Simple Tab</a:t>
-            </a:r>
-            <a:r>
-              <a:rPr lang="en-US" dirty="0" smtClean="0"/>
-              <a:t>le View</a:t>
+              <a:t>Simple Table View</a:t>
             </a:r>
             <a:endParaRPr lang="en" dirty="0"/>
           </a:p>
@@ -4109,11 +4309,7 @@
             </a:pPr>
             <a:r>
               <a:rPr lang="en-US" dirty="0" smtClean="0"/>
-              <a:t>Simple Tab</a:t>
-            </a:r>
-            <a:r>
-              <a:rPr lang="en-US" dirty="0" smtClean="0"/>
-              <a:t>le View</a:t>
+              <a:t>Simple Table View</a:t>
             </a:r>
             <a:endParaRPr lang="en" dirty="0"/>
           </a:p>
@@ -4189,11 +4385,7 @@
             </a:pPr>
             <a:r>
               <a:rPr lang="en-US" dirty="0" smtClean="0"/>
-              <a:t>Tab</a:t>
-            </a:r>
-            <a:r>
-              <a:rPr lang="en-US" dirty="0" smtClean="0"/>
-              <a:t>le View </a:t>
+              <a:t>Table View </a:t>
             </a:r>
             <a:r>
               <a:rPr lang="mr-IN" dirty="0" smtClean="0"/>
@@ -4583,6 +4775,405 @@
               <a:buNone/>
             </a:pPr>
             <a:r>
+              <a:rPr lang="en-US" dirty="0" err="1" smtClean="0"/>
+              <a:t>TextField</a:t>
+            </a:r>
+            <a:r>
+              <a:rPr lang="en-US" dirty="0" smtClean="0"/>
+              <a:t> </a:t>
+            </a:r>
+            <a:r>
+              <a:rPr lang="mr-IN" dirty="0" smtClean="0"/>
+              <a:t>–</a:t>
+            </a:r>
+            <a:r>
+              <a:rPr lang="en-US" dirty="0" smtClean="0"/>
+              <a:t> Binding</a:t>
+            </a:r>
+            <a:endParaRPr lang="en" dirty="0"/>
+          </a:p>
+        </p:txBody>
+      </p:sp>
+      <p:sp>
+        <p:nvSpPr>
+          <p:cNvPr id="192" name="Shape 192"/>
+          <p:cNvSpPr txBox="1">
+            <a:spLocks noGrp="1"/>
+          </p:cNvSpPr>
+          <p:nvPr>
+            <p:ph type="sldNum" idx="12"/>
+          </p:nvPr>
+        </p:nvSpPr>
+        <p:spPr>
+          <a:xfrm>
+            <a:off x="7618000" y="4636500"/>
+            <a:ext cx="1487400" cy="315600"/>
+          </a:xfrm>
+          <a:prstGeom prst="rect">
+            <a:avLst/>
+          </a:prstGeom>
+        </p:spPr>
+        <p:txBody>
+          <a:bodyPr wrap="square" lIns="91425" tIns="91425" rIns="91425" bIns="91425" anchor="ctr" anchorCtr="0">
+            <a:noAutofit/>
+          </a:bodyPr>
+          <a:lstStyle/>
+          <a:p>
+            <a:pPr lvl="0">
+              <a:spcBef>
+                <a:spcPts val="0"/>
+              </a:spcBef>
+              <a:buNone/>
+            </a:pPr>
+            <a:fld id="{00000000-1234-1234-1234-123412341234}" type="slidenum">
+              <a:rPr lang="en"/>
+              <a:t>6</a:t>
+            </a:fld>
+            <a:endParaRPr lang="en"/>
+          </a:p>
+        </p:txBody>
+      </p:sp>
+      <p:pic>
+        <p:nvPicPr>
+          <p:cNvPr id="2" name="Picture 1" descr="Rx_Logo_M.png"/>
+          <p:cNvPicPr>
+            <a:picLocks noChangeAspect="1"/>
+          </p:cNvPicPr>
+          <p:nvPr/>
+        </p:nvPicPr>
+        <p:blipFill>
+          <a:blip r:embed="rId3">
+            <a:extLst>
+              <a:ext uri="{28A0092B-C50C-407E-A947-70E740481C1C}">
+                <a14:useLocalDpi xmlns:a14="http://schemas.microsoft.com/office/drawing/2010/main" val="0"/>
+              </a:ext>
+            </a:extLst>
+          </a:blip>
+          <a:stretch>
+            <a:fillRect/>
+          </a:stretch>
+        </p:blipFill>
+        <p:spPr>
+          <a:xfrm>
+            <a:off x="151129" y="442005"/>
+            <a:ext cx="663146" cy="663146"/>
+          </a:xfrm>
+          <a:prstGeom prst="rect">
+            <a:avLst/>
+          </a:prstGeom>
+        </p:spPr>
+      </p:pic>
+      <p:pic>
+        <p:nvPicPr>
+          <p:cNvPr id="5" name="Picture 4" descr="Screen Shot 2018-05-16 at 7.58.46 PM.png"/>
+          <p:cNvPicPr>
+            <a:picLocks noChangeAspect="1"/>
+          </p:cNvPicPr>
+          <p:nvPr/>
+        </p:nvPicPr>
+        <p:blipFill>
+          <a:blip r:embed="rId4">
+            <a:extLst>
+              <a:ext uri="{28A0092B-C50C-407E-A947-70E740481C1C}">
+                <a14:useLocalDpi xmlns:a14="http://schemas.microsoft.com/office/drawing/2010/main" val="0"/>
+              </a:ext>
+            </a:extLst>
+          </a:blip>
+          <a:stretch>
+            <a:fillRect/>
+          </a:stretch>
+        </p:blipFill>
+        <p:spPr>
+          <a:xfrm>
+            <a:off x="4978400" y="1346910"/>
+            <a:ext cx="4165600" cy="3111500"/>
+          </a:xfrm>
+          <a:prstGeom prst="rect">
+            <a:avLst/>
+          </a:prstGeom>
+        </p:spPr>
+      </p:pic>
+      <p:pic>
+        <p:nvPicPr>
+          <p:cNvPr id="4" name="Picture 3" descr="Screen Shot 2018-05-16 at 7.58.35 PM.png"/>
+          <p:cNvPicPr>
+            <a:picLocks noChangeAspect="1"/>
+          </p:cNvPicPr>
+          <p:nvPr/>
+        </p:nvPicPr>
+        <p:blipFill>
+          <a:blip r:embed="rId5">
+            <a:extLst>
+              <a:ext uri="{28A0092B-C50C-407E-A947-70E740481C1C}">
+                <a14:useLocalDpi xmlns:a14="http://schemas.microsoft.com/office/drawing/2010/main" val="0"/>
+              </a:ext>
+            </a:extLst>
+          </a:blip>
+          <a:stretch>
+            <a:fillRect/>
+          </a:stretch>
+        </p:blipFill>
+        <p:spPr>
+          <a:xfrm>
+            <a:off x="0" y="1814948"/>
+            <a:ext cx="4978400" cy="1327316"/>
+          </a:xfrm>
+          <a:prstGeom prst="rect">
+            <a:avLst/>
+          </a:prstGeom>
+        </p:spPr>
+      </p:pic>
+    </p:spTree>
+    <p:extLst>
+      <p:ext uri="{BB962C8B-B14F-4D97-AF65-F5344CB8AC3E}">
+        <p14:creationId xmlns:p14="http://schemas.microsoft.com/office/powerpoint/2010/main" val="2148075556"/>
+      </p:ext>
+    </p:extLst>
+  </p:cSld>
+  <p:clrMapOvr>
+    <a:masterClrMapping/>
+  </p:clrMapOvr>
+  <p:timing>
+    <p:tnLst>
+      <p:par>
+        <p:cTn xmlns:p14="http://schemas.microsoft.com/office/powerpoint/2010/main" id="1" dur="indefinite" restart="never" nodeType="tmRoot"/>
+      </p:par>
+    </p:tnLst>
+  </p:timing>
+</p:sld>
+</file>
+
+<file path=ppt/slides/slide7.xml><?xml version="1.0" encoding="utf-8"?>
+<p:sld xmlns:a="http://schemas.openxmlformats.org/drawingml/2006/main" xmlns:r="http://schemas.openxmlformats.org/officeDocument/2006/relationships" xmlns:p="http://schemas.openxmlformats.org/presentationml/2006/main">
+  <p:cSld>
+    <p:spTree>
+      <p:nvGrpSpPr>
+        <p:cNvPr id="1" name="Shape 188"/>
+        <p:cNvGrpSpPr/>
+        <p:nvPr/>
+      </p:nvGrpSpPr>
+      <p:grpSpPr>
+        <a:xfrm>
+          <a:off x="0" y="0"/>
+          <a:ext cx="0" cy="0"/>
+          <a:chOff x="0" y="0"/>
+          <a:chExt cx="0" cy="0"/>
+        </a:xfrm>
+      </p:grpSpPr>
+      <p:sp>
+        <p:nvSpPr>
+          <p:cNvPr id="189" name="Shape 189"/>
+          <p:cNvSpPr txBox="1">
+            <a:spLocks noGrp="1"/>
+          </p:cNvSpPr>
+          <p:nvPr>
+            <p:ph type="title"/>
+          </p:nvPr>
+        </p:nvSpPr>
+        <p:spPr>
+          <a:xfrm>
+            <a:off x="814275" y="392575"/>
+            <a:ext cx="5258400" cy="766200"/>
+          </a:xfrm>
+          <a:prstGeom prst="rect">
+            <a:avLst/>
+          </a:prstGeom>
+        </p:spPr>
+        <p:txBody>
+          <a:bodyPr wrap="square" lIns="91425" tIns="91425" rIns="91425" bIns="91425" anchor="ctr" anchorCtr="0">
+            <a:noAutofit/>
+          </a:bodyPr>
+          <a:lstStyle/>
+          <a:p>
+            <a:pPr lvl="0"/>
+            <a:r>
+              <a:rPr lang="en-US" dirty="0" err="1"/>
+              <a:t>TextField</a:t>
+            </a:r>
+            <a:r>
+              <a:rPr lang="en-US" dirty="0"/>
+              <a:t> </a:t>
+            </a:r>
+            <a:r>
+              <a:rPr lang="mr-IN" dirty="0"/>
+              <a:t>–</a:t>
+            </a:r>
+            <a:r>
+              <a:rPr lang="en-US" dirty="0"/>
+              <a:t> Binding</a:t>
+            </a:r>
+            <a:endParaRPr lang="en" dirty="0"/>
+          </a:p>
+        </p:txBody>
+      </p:sp>
+      <p:sp>
+        <p:nvSpPr>
+          <p:cNvPr id="192" name="Shape 192"/>
+          <p:cNvSpPr txBox="1">
+            <a:spLocks noGrp="1"/>
+          </p:cNvSpPr>
+          <p:nvPr>
+            <p:ph type="sldNum" idx="12"/>
+          </p:nvPr>
+        </p:nvSpPr>
+        <p:spPr>
+          <a:xfrm>
+            <a:off x="7618000" y="4636500"/>
+            <a:ext cx="1487400" cy="315600"/>
+          </a:xfrm>
+          <a:prstGeom prst="rect">
+            <a:avLst/>
+          </a:prstGeom>
+        </p:spPr>
+        <p:txBody>
+          <a:bodyPr wrap="square" lIns="91425" tIns="91425" rIns="91425" bIns="91425" anchor="ctr" anchorCtr="0">
+            <a:noAutofit/>
+          </a:bodyPr>
+          <a:lstStyle/>
+          <a:p>
+            <a:pPr lvl="0">
+              <a:spcBef>
+                <a:spcPts val="0"/>
+              </a:spcBef>
+              <a:buNone/>
+            </a:pPr>
+            <a:fld id="{00000000-1234-1234-1234-123412341234}" type="slidenum">
+              <a:rPr lang="en"/>
+              <a:t>7</a:t>
+            </a:fld>
+            <a:endParaRPr lang="en"/>
+          </a:p>
+        </p:txBody>
+      </p:sp>
+      <p:pic>
+        <p:nvPicPr>
+          <p:cNvPr id="2" name="Picture 1" descr="Rx_Logo_M.png"/>
+          <p:cNvPicPr>
+            <a:picLocks noChangeAspect="1"/>
+          </p:cNvPicPr>
+          <p:nvPr/>
+        </p:nvPicPr>
+        <p:blipFill>
+          <a:blip r:embed="rId3">
+            <a:extLst>
+              <a:ext uri="{28A0092B-C50C-407E-A947-70E740481C1C}">
+                <a14:useLocalDpi xmlns:a14="http://schemas.microsoft.com/office/drawing/2010/main" val="0"/>
+              </a:ext>
+            </a:extLst>
+          </a:blip>
+          <a:stretch>
+            <a:fillRect/>
+          </a:stretch>
+        </p:blipFill>
+        <p:spPr>
+          <a:xfrm>
+            <a:off x="151129" y="442005"/>
+            <a:ext cx="663146" cy="663146"/>
+          </a:xfrm>
+          <a:prstGeom prst="rect">
+            <a:avLst/>
+          </a:prstGeom>
+        </p:spPr>
+      </p:pic>
+      <p:pic>
+        <p:nvPicPr>
+          <p:cNvPr id="4" name="Picture 3" descr="Screen Shot 2018-05-16 at 7.57.59 PM.png"/>
+          <p:cNvPicPr>
+            <a:picLocks noChangeAspect="1"/>
+          </p:cNvPicPr>
+          <p:nvPr/>
+        </p:nvPicPr>
+        <p:blipFill>
+          <a:blip r:embed="rId4">
+            <a:extLst>
+              <a:ext uri="{28A0092B-C50C-407E-A947-70E740481C1C}">
+                <a14:useLocalDpi xmlns:a14="http://schemas.microsoft.com/office/drawing/2010/main" val="0"/>
+              </a:ext>
+            </a:extLst>
+          </a:blip>
+          <a:stretch>
+            <a:fillRect/>
+          </a:stretch>
+        </p:blipFill>
+        <p:spPr>
+          <a:xfrm>
+            <a:off x="0" y="1613334"/>
+            <a:ext cx="9144000" cy="2719457"/>
+          </a:xfrm>
+          <a:prstGeom prst="rect">
+            <a:avLst/>
+          </a:prstGeom>
+        </p:spPr>
+      </p:pic>
+    </p:spTree>
+    <p:extLst>
+      <p:ext uri="{BB962C8B-B14F-4D97-AF65-F5344CB8AC3E}">
+        <p14:creationId xmlns:p14="http://schemas.microsoft.com/office/powerpoint/2010/main" val="880534053"/>
+      </p:ext>
+    </p:extLst>
+  </p:cSld>
+  <p:clrMapOvr>
+    <a:masterClrMapping/>
+  </p:clrMapOvr>
+  <p:timing>
+    <p:tnLst>
+      <p:par>
+        <p:cTn xmlns:p14="http://schemas.microsoft.com/office/powerpoint/2010/main" id="1" dur="indefinite" restart="never" nodeType="tmRoot"/>
+      </p:par>
+    </p:tnLst>
+  </p:timing>
+</p:sld>
+</file>
+
+<file path=ppt/slides/slide8.xml><?xml version="1.0" encoding="utf-8"?>
+<p:sld xmlns:a="http://schemas.openxmlformats.org/drawingml/2006/main" xmlns:r="http://schemas.openxmlformats.org/officeDocument/2006/relationships" xmlns:p="http://schemas.openxmlformats.org/presentationml/2006/main">
+  <p:cSld>
+    <p:spTree>
+      <p:nvGrpSpPr>
+        <p:cNvPr id="1" name="Shape 188"/>
+        <p:cNvGrpSpPr/>
+        <p:nvPr/>
+      </p:nvGrpSpPr>
+      <p:grpSpPr>
+        <a:xfrm>
+          <a:off x="0" y="0"/>
+          <a:ext cx="0" cy="0"/>
+          <a:chOff x="0" y="0"/>
+          <a:chExt cx="0" cy="0"/>
+        </a:xfrm>
+      </p:grpSpPr>
+      <p:sp>
+        <p:nvSpPr>
+          <p:cNvPr id="189" name="Shape 189"/>
+          <p:cNvSpPr txBox="1">
+            <a:spLocks noGrp="1"/>
+          </p:cNvSpPr>
+          <p:nvPr>
+            <p:ph type="title"/>
+          </p:nvPr>
+        </p:nvSpPr>
+        <p:spPr>
+          <a:xfrm>
+            <a:off x="814275" y="392575"/>
+            <a:ext cx="5258400" cy="766200"/>
+          </a:xfrm>
+          <a:prstGeom prst="rect">
+            <a:avLst/>
+          </a:prstGeom>
+        </p:spPr>
+        <p:txBody>
+          <a:bodyPr wrap="square" lIns="91425" tIns="91425" rIns="91425" bIns="91425" anchor="ctr" anchorCtr="0">
+            <a:noAutofit/>
+          </a:bodyPr>
+          <a:lstStyle/>
+          <a:p>
+            <a:pPr lvl="0" rtl="0">
+              <a:spcBef>
+                <a:spcPts val="0"/>
+              </a:spcBef>
+              <a:buNone/>
+            </a:pPr>
+            <a:r>
               <a:rPr lang="en-US" dirty="0" smtClean="0"/>
               <a:t>Comprehensive Lab</a:t>
             </a:r>
@@ -4623,7 +5214,7 @@
             </a:pPr>
             <a:fld id="{00000000-1234-1234-1234-123412341234}" type="slidenum">
               <a:rPr lang="en"/>
-              <a:t>6</a:t>
+              <a:t>8</a:t>
             </a:fld>
             <a:endParaRPr lang="en"/>
           </a:p>
@@ -4779,7 +5370,7 @@
     </p:spTree>
     <p:extLst>
       <p:ext uri="{BB962C8B-B14F-4D97-AF65-F5344CB8AC3E}">
-        <p14:creationId xmlns:p14="http://schemas.microsoft.com/office/powerpoint/2010/main" val="2148075556"/>
+        <p14:creationId xmlns:p14="http://schemas.microsoft.com/office/powerpoint/2010/main" val="2777061132"/>
       </p:ext>
     </p:extLst>
   </p:cSld>

</xml_diff>